<commit_message>
fix the new mapping
</commit_message>
<xml_diff>
--- a/report/report diagrams.pptx
+++ b/report/report diagrams.pptx
@@ -199,7 +199,7 @@
           <a:p>
             <a:fld id="{3F93E8E0-5D27-1248-BE24-90C77D8996BA}" type="datetimeFigureOut">
               <a:rPr lang="en-US" smtClean="0"/>
-              <a:t>6/18/23</a:t>
+              <a:t>6/20/23</a:t>
             </a:fld>
             <a:endParaRPr lang="en-US"/>
           </a:p>
@@ -700,7 +700,7 @@
           <a:p>
             <a:fld id="{446C6B02-1201-BC4F-8CD8-04EAE4792AA6}" type="datetimeFigureOut">
               <a:rPr lang="en-US" smtClean="0"/>
-              <a:t>6/18/23</a:t>
+              <a:t>6/20/23</a:t>
             </a:fld>
             <a:endParaRPr lang="en-US"/>
           </a:p>
@@ -900,7 +900,7 @@
           <a:p>
             <a:fld id="{446C6B02-1201-BC4F-8CD8-04EAE4792AA6}" type="datetimeFigureOut">
               <a:rPr lang="en-US" smtClean="0"/>
-              <a:t>6/18/23</a:t>
+              <a:t>6/20/23</a:t>
             </a:fld>
             <a:endParaRPr lang="en-US"/>
           </a:p>
@@ -1110,7 +1110,7 @@
           <a:p>
             <a:fld id="{446C6B02-1201-BC4F-8CD8-04EAE4792AA6}" type="datetimeFigureOut">
               <a:rPr lang="en-US" smtClean="0"/>
-              <a:t>6/18/23</a:t>
+              <a:t>6/20/23</a:t>
             </a:fld>
             <a:endParaRPr lang="en-US"/>
           </a:p>
@@ -1310,7 +1310,7 @@
           <a:p>
             <a:fld id="{446C6B02-1201-BC4F-8CD8-04EAE4792AA6}" type="datetimeFigureOut">
               <a:rPr lang="en-US" smtClean="0"/>
-              <a:t>6/18/23</a:t>
+              <a:t>6/20/23</a:t>
             </a:fld>
             <a:endParaRPr lang="en-US"/>
           </a:p>
@@ -1586,7 +1586,7 @@
           <a:p>
             <a:fld id="{446C6B02-1201-BC4F-8CD8-04EAE4792AA6}" type="datetimeFigureOut">
               <a:rPr lang="en-US" smtClean="0"/>
-              <a:t>6/18/23</a:t>
+              <a:t>6/20/23</a:t>
             </a:fld>
             <a:endParaRPr lang="en-US"/>
           </a:p>
@@ -1854,7 +1854,7 @@
           <a:p>
             <a:fld id="{446C6B02-1201-BC4F-8CD8-04EAE4792AA6}" type="datetimeFigureOut">
               <a:rPr lang="en-US" smtClean="0"/>
-              <a:t>6/18/23</a:t>
+              <a:t>6/20/23</a:t>
             </a:fld>
             <a:endParaRPr lang="en-US"/>
           </a:p>
@@ -2269,7 +2269,7 @@
           <a:p>
             <a:fld id="{446C6B02-1201-BC4F-8CD8-04EAE4792AA6}" type="datetimeFigureOut">
               <a:rPr lang="en-US" smtClean="0"/>
-              <a:t>6/18/23</a:t>
+              <a:t>6/20/23</a:t>
             </a:fld>
             <a:endParaRPr lang="en-US"/>
           </a:p>
@@ -2411,7 +2411,7 @@
           <a:p>
             <a:fld id="{446C6B02-1201-BC4F-8CD8-04EAE4792AA6}" type="datetimeFigureOut">
               <a:rPr lang="en-US" smtClean="0"/>
-              <a:t>6/18/23</a:t>
+              <a:t>6/20/23</a:t>
             </a:fld>
             <a:endParaRPr lang="en-US"/>
           </a:p>
@@ -2524,7 +2524,7 @@
           <a:p>
             <a:fld id="{446C6B02-1201-BC4F-8CD8-04EAE4792AA6}" type="datetimeFigureOut">
               <a:rPr lang="en-US" smtClean="0"/>
-              <a:t>6/18/23</a:t>
+              <a:t>6/20/23</a:t>
             </a:fld>
             <a:endParaRPr lang="en-US"/>
           </a:p>
@@ -2837,7 +2837,7 @@
           <a:p>
             <a:fld id="{446C6B02-1201-BC4F-8CD8-04EAE4792AA6}" type="datetimeFigureOut">
               <a:rPr lang="en-US" smtClean="0"/>
-              <a:t>6/18/23</a:t>
+              <a:t>6/20/23</a:t>
             </a:fld>
             <a:endParaRPr lang="en-US"/>
           </a:p>
@@ -3126,7 +3126,7 @@
           <a:p>
             <a:fld id="{446C6B02-1201-BC4F-8CD8-04EAE4792AA6}" type="datetimeFigureOut">
               <a:rPr lang="en-US" smtClean="0"/>
-              <a:t>6/18/23</a:t>
+              <a:t>6/20/23</a:t>
             </a:fld>
             <a:endParaRPr lang="en-US"/>
           </a:p>
@@ -3369,7 +3369,7 @@
           <a:p>
             <a:fld id="{446C6B02-1201-BC4F-8CD8-04EAE4792AA6}" type="datetimeFigureOut">
               <a:rPr lang="en-US" smtClean="0"/>
-              <a:t>6/18/23</a:t>
+              <a:t>6/20/23</a:t>
             </a:fld>
             <a:endParaRPr lang="en-US"/>
           </a:p>
@@ -5322,21 +5322,8 @@
                     <a:sysClr val="windowText" lastClr="000000"/>
                   </a:solidFill>
                 </a:rPr>
-                <a:t>Task </a:t>
+                <a:t>Task Scheduler</a:t>
               </a:r>
-              <a:r>
-                <a:rPr lang="en-US" sz="2000" dirty="0" err="1">
-                  <a:solidFill>
-                    <a:sysClr val="windowText" lastClr="000000"/>
-                  </a:solidFill>
-                </a:rPr>
-                <a:t>Scheduluer</a:t>
-              </a:r>
-              <a:endParaRPr lang="en-US" sz="2000" dirty="0">
-                <a:solidFill>
-                  <a:sysClr val="windowText" lastClr="000000"/>
-                </a:solidFill>
-              </a:endParaRPr>
             </a:p>
           </p:txBody>
         </p:sp>

</xml_diff>